<commit_message>
update Pi Gateway2, LazuriteBLE, PumpMonitoring
</commit_message>
<xml_diff>
--- a/project/LazuriteBLE/170301_LazuriteBLE/LazuriteBLE_connector.pptx
+++ b/project/LazuriteBLE/170301_LazuriteBLE/LazuriteBLE_connector.pptx
@@ -5,13 +5,14 @@
     <p:sldMasterId id="2147483648" r:id="rId1"/>
   </p:sldMasterIdLst>
   <p:notesMasterIdLst>
-    <p:notesMasterId r:id="rId3"/>
+    <p:notesMasterId r:id="rId4"/>
   </p:notesMasterIdLst>
   <p:handoutMasterIdLst>
-    <p:handoutMasterId r:id="rId4"/>
+    <p:handoutMasterId r:id="rId5"/>
   </p:handoutMasterIdLst>
   <p:sldIdLst>
-    <p:sldId id="259" r:id="rId2"/>
+    <p:sldId id="260" r:id="rId2"/>
+    <p:sldId id="259" r:id="rId3"/>
   </p:sldIdLst>
   <p:sldSz cx="9144000" cy="6858000" type="screen4x3"/>
   <p:notesSz cx="6735763" cy="9866313"/>
@@ -2857,6 +2858,775 @@
           <a:chExt cx="0" cy="0"/>
         </a:xfrm>
       </p:grpSpPr>
+      <p:sp>
+        <p:nvSpPr>
+          <p:cNvPr id="2" name="タイトル 1"/>
+          <p:cNvSpPr>
+            <a:spLocks noGrp="1"/>
+          </p:cNvSpPr>
+          <p:nvPr>
+            <p:ph type="title"/>
+          </p:nvPr>
+        </p:nvSpPr>
+        <p:spPr/>
+        <p:txBody>
+          <a:bodyPr/>
+          <a:lstStyle/>
+          <a:p>
+            <a:r>
+              <a:rPr kumimoji="1" lang="ja-JP" altLang="en-US" dirty="0" smtClean="0"/>
+              <a:t>支給部品</a:t>
+            </a:r>
+            <a:endParaRPr kumimoji="1" lang="ja-JP" altLang="en-US" dirty="0"/>
+          </a:p>
+        </p:txBody>
+      </p:sp>
+      <p:sp>
+        <p:nvSpPr>
+          <p:cNvPr id="3" name="コンテンツ プレースホルダー 2"/>
+          <p:cNvSpPr>
+            <a:spLocks noGrp="1"/>
+          </p:cNvSpPr>
+          <p:nvPr>
+            <p:ph idx="1"/>
+          </p:nvPr>
+        </p:nvSpPr>
+        <p:spPr>
+          <a:xfrm>
+            <a:off x="322263" y="895350"/>
+            <a:ext cx="8382000" cy="5485978"/>
+          </a:xfrm>
+        </p:spPr>
+        <p:txBody>
+          <a:bodyPr/>
+          <a:lstStyle/>
+          <a:p>
+            <a:r>
+              <a:rPr lang="ja-JP" altLang="en-US" sz="1100" dirty="0" smtClean="0">
+                <a:latin typeface="ＭＳ ゴシック" panose="020B0609070205080204" pitchFamily="49" charset="-128"/>
+                <a:ea typeface="ＭＳ ゴシック" panose="020B0609070205080204" pitchFamily="49" charset="-128"/>
+              </a:rPr>
+              <a:t>■支給部品</a:t>
+            </a:r>
+            <a:endParaRPr lang="en-US" altLang="ja-JP" sz="1100" dirty="0" smtClean="0">
+              <a:latin typeface="ＭＳ ゴシック" panose="020B0609070205080204" pitchFamily="49" charset="-128"/>
+              <a:ea typeface="ＭＳ ゴシック" panose="020B0609070205080204" pitchFamily="49" charset="-128"/>
+            </a:endParaRPr>
+          </a:p>
+          <a:p>
+            <a:r>
+              <a:rPr lang="en-US" altLang="ja-JP" sz="1100" dirty="0">
+                <a:latin typeface="ＭＳ ゴシック" panose="020B0609070205080204" pitchFamily="49" charset="-128"/>
+                <a:ea typeface="ＭＳ ゴシック" panose="020B0609070205080204" pitchFamily="49" charset="-128"/>
+              </a:rPr>
+              <a:t>U$1      ML620Q504      </a:t>
+            </a:r>
+            <a:r>
+              <a:rPr lang="en-US" altLang="ja-JP" sz="1100" dirty="0" err="1">
+                <a:latin typeface="ＭＳ ゴシック" panose="020B0609070205080204" pitchFamily="49" charset="-128"/>
+                <a:ea typeface="ＭＳ ゴシック" panose="020B0609070205080204" pitchFamily="49" charset="-128"/>
+              </a:rPr>
+              <a:t>ML620Q504</a:t>
+            </a:r>
+            <a:r>
+              <a:rPr lang="en-US" altLang="ja-JP" sz="1100" dirty="0">
+                <a:latin typeface="ＭＳ ゴシック" panose="020B0609070205080204" pitchFamily="49" charset="-128"/>
+                <a:ea typeface="ＭＳ ゴシック" panose="020B0609070205080204" pitchFamily="49" charset="-128"/>
+              </a:rPr>
+              <a:t>                   </a:t>
+            </a:r>
+            <a:r>
+              <a:rPr lang="en-US" altLang="ja-JP" sz="1100" dirty="0" err="1">
+                <a:latin typeface="ＭＳ ゴシック" panose="020B0609070205080204" pitchFamily="49" charset="-128"/>
+                <a:ea typeface="ＭＳ ゴシック" panose="020B0609070205080204" pitchFamily="49" charset="-128"/>
+              </a:rPr>
+              <a:t>lazurite</a:t>
+            </a:r>
+            <a:r>
+              <a:rPr lang="en-US" altLang="ja-JP" sz="1100" dirty="0">
+                <a:latin typeface="ＭＳ ゴシック" panose="020B0609070205080204" pitchFamily="49" charset="-128"/>
+                <a:ea typeface="ＭＳ ゴシック" panose="020B0609070205080204" pitchFamily="49" charset="-128"/>
+              </a:rPr>
+              <a:t>  (500 575)             MR90</a:t>
+            </a:r>
+          </a:p>
+          <a:p>
+            <a:r>
+              <a:rPr lang="en-US" altLang="ja-JP" sz="1100" dirty="0">
+                <a:latin typeface="ＭＳ ゴシック" panose="020B0609070205080204" pitchFamily="49" charset="-128"/>
+                <a:ea typeface="ＭＳ ゴシック" panose="020B0609070205080204" pitchFamily="49" charset="-128"/>
+              </a:rPr>
+              <a:t>U$4      MK71251-02     </a:t>
+            </a:r>
+            <a:r>
+              <a:rPr lang="en-US" altLang="ja-JP" sz="1100" dirty="0" err="1">
+                <a:latin typeface="ＭＳ ゴシック" panose="020B0609070205080204" pitchFamily="49" charset="-128"/>
+                <a:ea typeface="ＭＳ ゴシック" panose="020B0609070205080204" pitchFamily="49" charset="-128"/>
+              </a:rPr>
+              <a:t>MK71251-02</a:t>
+            </a:r>
+            <a:r>
+              <a:rPr lang="en-US" altLang="ja-JP" sz="1100" dirty="0">
+                <a:latin typeface="ＭＳ ゴシック" panose="020B0609070205080204" pitchFamily="49" charset="-128"/>
+                <a:ea typeface="ＭＳ ゴシック" panose="020B0609070205080204" pitchFamily="49" charset="-128"/>
+              </a:rPr>
+              <a:t>                  </a:t>
+            </a:r>
+            <a:r>
+              <a:rPr lang="en-US" altLang="ja-JP" sz="1100" dirty="0" err="1">
+                <a:latin typeface="ＭＳ ゴシック" panose="020B0609070205080204" pitchFamily="49" charset="-128"/>
+                <a:ea typeface="ＭＳ ゴシック" panose="020B0609070205080204" pitchFamily="49" charset="-128"/>
+              </a:rPr>
+              <a:t>lz</a:t>
+            </a:r>
+            <a:r>
+              <a:rPr lang="en-US" altLang="ja-JP" sz="1100" dirty="0">
+                <a:latin typeface="ＭＳ ゴシック" panose="020B0609070205080204" pitchFamily="49" charset="-128"/>
+                <a:ea typeface="ＭＳ ゴシック" panose="020B0609070205080204" pitchFamily="49" charset="-128"/>
+              </a:rPr>
+              <a:t>-shield (1000 450)            R270</a:t>
+            </a:r>
+          </a:p>
+          <a:p>
+            <a:r>
+              <a:rPr lang="en-US" altLang="ja-JP" sz="1100" dirty="0">
+                <a:latin typeface="ＭＳ ゴシック" panose="020B0609070205080204" pitchFamily="49" charset="-128"/>
+                <a:ea typeface="ＭＳ ゴシック" panose="020B0609070205080204" pitchFamily="49" charset="-128"/>
+              </a:rPr>
+              <a:t>U$6      BH33PB1WFV     HVSOF5                      </a:t>
+            </a:r>
+            <a:r>
+              <a:rPr lang="en-US" altLang="ja-JP" sz="1100" dirty="0" err="1">
+                <a:latin typeface="ＭＳ ゴシック" panose="020B0609070205080204" pitchFamily="49" charset="-128"/>
+                <a:ea typeface="ＭＳ ゴシック" panose="020B0609070205080204" pitchFamily="49" charset="-128"/>
+              </a:rPr>
+              <a:t>lazurite</a:t>
+            </a:r>
+            <a:r>
+              <a:rPr lang="en-US" altLang="ja-JP" sz="1100" dirty="0">
+                <a:latin typeface="ＭＳ ゴシック" panose="020B0609070205080204" pitchFamily="49" charset="-128"/>
+                <a:ea typeface="ＭＳ ゴシック" panose="020B0609070205080204" pitchFamily="49" charset="-128"/>
+              </a:rPr>
+              <a:t>  (450 262.5)           R180</a:t>
+            </a:r>
+          </a:p>
+          <a:p>
+            <a:r>
+              <a:rPr lang="en-US" altLang="ja-JP" sz="1100" dirty="0">
+                <a:latin typeface="ＭＳ ゴシック" panose="020B0609070205080204" pitchFamily="49" charset="-128"/>
+                <a:ea typeface="ＭＳ ゴシック" panose="020B0609070205080204" pitchFamily="49" charset="-128"/>
+              </a:rPr>
+              <a:t>U$16     SML-E12U8WT86  SML-E1X                     </a:t>
+            </a:r>
+            <a:r>
+              <a:rPr lang="en-US" altLang="ja-JP" sz="1100" dirty="0" err="1">
+                <a:latin typeface="ＭＳ ゴシック" panose="020B0609070205080204" pitchFamily="49" charset="-128"/>
+                <a:ea typeface="ＭＳ ゴシック" panose="020B0609070205080204" pitchFamily="49" charset="-128"/>
+              </a:rPr>
+              <a:t>lazurite</a:t>
+            </a:r>
+            <a:r>
+              <a:rPr lang="en-US" altLang="ja-JP" sz="1100" dirty="0">
+                <a:latin typeface="ＭＳ ゴシック" panose="020B0609070205080204" pitchFamily="49" charset="-128"/>
+                <a:ea typeface="ＭＳ ゴシック" panose="020B0609070205080204" pitchFamily="49" charset="-128"/>
+              </a:rPr>
+              <a:t>  (300 500)             R90</a:t>
+            </a:r>
+          </a:p>
+          <a:p>
+            <a:r>
+              <a:rPr lang="en-US" altLang="ja-JP" sz="1100" dirty="0">
+                <a:latin typeface="ＭＳ ゴシック" panose="020B0609070205080204" pitchFamily="49" charset="-128"/>
+                <a:ea typeface="ＭＳ ゴシック" panose="020B0609070205080204" pitchFamily="49" charset="-128"/>
+              </a:rPr>
+              <a:t>U$17     SML-E12Y8W     SML-E1X                     </a:t>
+            </a:r>
+            <a:r>
+              <a:rPr lang="en-US" altLang="ja-JP" sz="1100" dirty="0" err="1">
+                <a:latin typeface="ＭＳ ゴシック" panose="020B0609070205080204" pitchFamily="49" charset="-128"/>
+                <a:ea typeface="ＭＳ ゴシック" panose="020B0609070205080204" pitchFamily="49" charset="-128"/>
+              </a:rPr>
+              <a:t>lazurite</a:t>
+            </a:r>
+            <a:r>
+              <a:rPr lang="en-US" altLang="ja-JP" sz="1100" dirty="0">
+                <a:latin typeface="ＭＳ ゴシック" panose="020B0609070205080204" pitchFamily="49" charset="-128"/>
+                <a:ea typeface="ＭＳ ゴシック" panose="020B0609070205080204" pitchFamily="49" charset="-128"/>
+              </a:rPr>
+              <a:t>  (300 400)             R90</a:t>
+            </a:r>
+          </a:p>
+          <a:p>
+            <a:r>
+              <a:rPr lang="en-US" altLang="ja-JP" sz="1100" dirty="0">
+                <a:latin typeface="ＭＳ ゴシック" panose="020B0609070205080204" pitchFamily="49" charset="-128"/>
+                <a:ea typeface="ＭＳ ゴシック" panose="020B0609070205080204" pitchFamily="49" charset="-128"/>
+              </a:rPr>
+              <a:t>U$18     SML-E13BC8T    SML-E1X                     </a:t>
+            </a:r>
+            <a:r>
+              <a:rPr lang="en-US" altLang="ja-JP" sz="1100" dirty="0" err="1">
+                <a:latin typeface="ＭＳ ゴシック" panose="020B0609070205080204" pitchFamily="49" charset="-128"/>
+                <a:ea typeface="ＭＳ ゴシック" panose="020B0609070205080204" pitchFamily="49" charset="-128"/>
+              </a:rPr>
+              <a:t>lazurite</a:t>
+            </a:r>
+            <a:r>
+              <a:rPr lang="en-US" altLang="ja-JP" sz="1100" dirty="0">
+                <a:latin typeface="ＭＳ ゴシック" panose="020B0609070205080204" pitchFamily="49" charset="-128"/>
+                <a:ea typeface="ＭＳ ゴシック" panose="020B0609070205080204" pitchFamily="49" charset="-128"/>
+              </a:rPr>
+              <a:t>  (300 450)             R90</a:t>
+            </a:r>
+          </a:p>
+          <a:p>
+            <a:r>
+              <a:rPr lang="en-US" altLang="ja-JP" sz="1100" dirty="0">
+                <a:latin typeface="ＭＳ ゴシック" panose="020B0609070205080204" pitchFamily="49" charset="-128"/>
+                <a:ea typeface="ＭＳ ゴシック" panose="020B0609070205080204" pitchFamily="49" charset="-128"/>
+              </a:rPr>
+              <a:t>U1                      LAZURITE920J2               </a:t>
+            </a:r>
+            <a:r>
+              <a:rPr lang="en-US" altLang="ja-JP" sz="1100" dirty="0" err="1">
+                <a:latin typeface="ＭＳ ゴシック" panose="020B0609070205080204" pitchFamily="49" charset="-128"/>
+                <a:ea typeface="ＭＳ ゴシック" panose="020B0609070205080204" pitchFamily="49" charset="-128"/>
+              </a:rPr>
+              <a:t>lazurite</a:t>
+            </a:r>
+            <a:r>
+              <a:rPr lang="en-US" altLang="ja-JP" sz="1100" dirty="0">
+                <a:latin typeface="ＭＳ ゴシック" panose="020B0609070205080204" pitchFamily="49" charset="-128"/>
+                <a:ea typeface="ＭＳ ゴシック" panose="020B0609070205080204" pitchFamily="49" charset="-128"/>
+              </a:rPr>
+              <a:t>  (75 275)              R0</a:t>
+            </a:r>
+            <a:endParaRPr lang="ja-JP" altLang="en-US" sz="1100" dirty="0">
+              <a:latin typeface="ＭＳ ゴシック" panose="020B0609070205080204" pitchFamily="49" charset="-128"/>
+              <a:ea typeface="ＭＳ ゴシック" panose="020B0609070205080204" pitchFamily="49" charset="-128"/>
+            </a:endParaRPr>
+          </a:p>
+          <a:p>
+            <a:r>
+              <a:rPr lang="ja-JP" altLang="en-US" sz="1100" dirty="0" smtClean="0">
+                <a:latin typeface="ＭＳ ゴシック" panose="020B0609070205080204" pitchFamily="49" charset="-128"/>
+                <a:ea typeface="ＭＳ ゴシック" panose="020B0609070205080204" pitchFamily="49" charset="-128"/>
+              </a:rPr>
+              <a:t>■未支給部品</a:t>
+            </a:r>
+            <a:endParaRPr lang="en-US" altLang="ja-JP" sz="1100" dirty="0" smtClean="0">
+              <a:latin typeface="ＭＳ ゴシック" panose="020B0609070205080204" pitchFamily="49" charset="-128"/>
+              <a:ea typeface="ＭＳ ゴシック" panose="020B0609070205080204" pitchFamily="49" charset="-128"/>
+            </a:endParaRPr>
+          </a:p>
+          <a:p>
+            <a:r>
+              <a:rPr lang="en-US" altLang="ja-JP" sz="1100" dirty="0" smtClean="0">
+                <a:latin typeface="ＭＳ ゴシック" panose="020B0609070205080204" pitchFamily="49" charset="-128"/>
+                <a:ea typeface="ＭＳ ゴシック" panose="020B0609070205080204" pitchFamily="49" charset="-128"/>
+              </a:rPr>
+              <a:t>U$3      </a:t>
+            </a:r>
+            <a:r>
+              <a:rPr lang="en-US" altLang="ja-JP" sz="1100" dirty="0">
+                <a:latin typeface="ＭＳ ゴシック" panose="020B0609070205080204" pitchFamily="49" charset="-128"/>
+                <a:ea typeface="ＭＳ ゴシック" panose="020B0609070205080204" pitchFamily="49" charset="-128"/>
+              </a:rPr>
+              <a:t>NX3215SA       NX3215SA-32,768K-SFD-MUA-14 </a:t>
+            </a:r>
+            <a:r>
+              <a:rPr lang="en-US" altLang="ja-JP" sz="1100" dirty="0" err="1">
+                <a:latin typeface="ＭＳ ゴシック" panose="020B0609070205080204" pitchFamily="49" charset="-128"/>
+                <a:ea typeface="ＭＳ ゴシック" panose="020B0609070205080204" pitchFamily="49" charset="-128"/>
+              </a:rPr>
+              <a:t>lazurite</a:t>
+            </a:r>
+            <a:r>
+              <a:rPr lang="en-US" altLang="ja-JP" sz="1100" dirty="0">
+                <a:latin typeface="ＭＳ ゴシック" panose="020B0609070205080204" pitchFamily="49" charset="-128"/>
+                <a:ea typeface="ＭＳ ゴシック" panose="020B0609070205080204" pitchFamily="49" charset="-128"/>
+              </a:rPr>
+              <a:t>  (350 275)             </a:t>
+            </a:r>
+            <a:r>
+              <a:rPr lang="en-US" altLang="ja-JP" sz="1100" dirty="0" smtClean="0">
+                <a:latin typeface="ＭＳ ゴシック" panose="020B0609070205080204" pitchFamily="49" charset="-128"/>
+                <a:ea typeface="ＭＳ ゴシック" panose="020B0609070205080204" pitchFamily="49" charset="-128"/>
+              </a:rPr>
+              <a:t>MR0</a:t>
+            </a:r>
+          </a:p>
+          <a:p>
+            <a:r>
+              <a:rPr lang="en-US" altLang="ja-JP" sz="1100" dirty="0">
+                <a:latin typeface="ＭＳ ゴシック" panose="020B0609070205080204" pitchFamily="49" charset="-128"/>
+                <a:ea typeface="ＭＳ ゴシック" panose="020B0609070205080204" pitchFamily="49" charset="-128"/>
+              </a:rPr>
+              <a:t>C1       0.1u           C0402                       </a:t>
+            </a:r>
+            <a:r>
+              <a:rPr lang="en-US" altLang="ja-JP" sz="1100" dirty="0" err="1">
+                <a:latin typeface="ＭＳ ゴシック" panose="020B0609070205080204" pitchFamily="49" charset="-128"/>
+                <a:ea typeface="ＭＳ ゴシック" panose="020B0609070205080204" pitchFamily="49" charset="-128"/>
+              </a:rPr>
+              <a:t>rcl</a:t>
+            </a:r>
+            <a:r>
+              <a:rPr lang="en-US" altLang="ja-JP" sz="1100" dirty="0">
+                <a:latin typeface="ＭＳ ゴシック" panose="020B0609070205080204" pitchFamily="49" charset="-128"/>
+                <a:ea typeface="ＭＳ ゴシック" panose="020B0609070205080204" pitchFamily="49" charset="-128"/>
+              </a:rPr>
+              <a:t>       (375 800)             MR180</a:t>
+            </a:r>
+          </a:p>
+          <a:p>
+            <a:r>
+              <a:rPr lang="en-US" altLang="ja-JP" sz="1100" dirty="0">
+                <a:latin typeface="ＭＳ ゴシック" panose="020B0609070205080204" pitchFamily="49" charset="-128"/>
+                <a:ea typeface="ＭＳ ゴシック" panose="020B0609070205080204" pitchFamily="49" charset="-128"/>
+              </a:rPr>
+              <a:t>C2       1u             C0402                       </a:t>
+            </a:r>
+            <a:r>
+              <a:rPr lang="en-US" altLang="ja-JP" sz="1100" dirty="0" err="1">
+                <a:latin typeface="ＭＳ ゴシック" panose="020B0609070205080204" pitchFamily="49" charset="-128"/>
+                <a:ea typeface="ＭＳ ゴシック" panose="020B0609070205080204" pitchFamily="49" charset="-128"/>
+              </a:rPr>
+              <a:t>rcl</a:t>
+            </a:r>
+            <a:r>
+              <a:rPr lang="en-US" altLang="ja-JP" sz="1100" dirty="0">
+                <a:latin typeface="ＭＳ ゴシック" panose="020B0609070205080204" pitchFamily="49" charset="-128"/>
+                <a:ea typeface="ＭＳ ゴシック" panose="020B0609070205080204" pitchFamily="49" charset="-128"/>
+              </a:rPr>
+              <a:t>       (250 737.5)           MR90</a:t>
+            </a:r>
+          </a:p>
+          <a:p>
+            <a:r>
+              <a:rPr lang="en-US" altLang="ja-JP" sz="1100" dirty="0">
+                <a:latin typeface="ＭＳ ゴシック" panose="020B0609070205080204" pitchFamily="49" charset="-128"/>
+                <a:ea typeface="ＭＳ ゴシック" panose="020B0609070205080204" pitchFamily="49" charset="-128"/>
+              </a:rPr>
+              <a:t>C3       33000p         C0402                       </a:t>
+            </a:r>
+            <a:r>
+              <a:rPr lang="en-US" altLang="ja-JP" sz="1100" dirty="0" err="1">
+                <a:latin typeface="ＭＳ ゴシック" panose="020B0609070205080204" pitchFamily="49" charset="-128"/>
+                <a:ea typeface="ＭＳ ゴシック" panose="020B0609070205080204" pitchFamily="49" charset="-128"/>
+              </a:rPr>
+              <a:t>rcl</a:t>
+            </a:r>
+            <a:r>
+              <a:rPr lang="en-US" altLang="ja-JP" sz="1100" dirty="0">
+                <a:latin typeface="ＭＳ ゴシック" panose="020B0609070205080204" pitchFamily="49" charset="-128"/>
+                <a:ea typeface="ＭＳ ゴシック" panose="020B0609070205080204" pitchFamily="49" charset="-128"/>
+              </a:rPr>
+              <a:t>       (637.5 237.5)         MR180</a:t>
+            </a:r>
+          </a:p>
+          <a:p>
+            <a:r>
+              <a:rPr lang="en-US" altLang="ja-JP" sz="1100" dirty="0">
+                <a:latin typeface="ＭＳ ゴシック" panose="020B0609070205080204" pitchFamily="49" charset="-128"/>
+                <a:ea typeface="ＭＳ ゴシック" panose="020B0609070205080204" pitchFamily="49" charset="-128"/>
+              </a:rPr>
+              <a:t>C4       2.2u           C0402                       </a:t>
+            </a:r>
+            <a:r>
+              <a:rPr lang="en-US" altLang="ja-JP" sz="1100" dirty="0" err="1">
+                <a:latin typeface="ＭＳ ゴシック" panose="020B0609070205080204" pitchFamily="49" charset="-128"/>
+                <a:ea typeface="ＭＳ ゴシック" panose="020B0609070205080204" pitchFamily="49" charset="-128"/>
+              </a:rPr>
+              <a:t>rcl</a:t>
+            </a:r>
+            <a:r>
+              <a:rPr lang="en-US" altLang="ja-JP" sz="1100" dirty="0">
+                <a:latin typeface="ＭＳ ゴシック" panose="020B0609070205080204" pitchFamily="49" charset="-128"/>
+                <a:ea typeface="ＭＳ ゴシック" panose="020B0609070205080204" pitchFamily="49" charset="-128"/>
+              </a:rPr>
+              <a:t>       (637.5 337.5)         MR180</a:t>
+            </a:r>
+          </a:p>
+          <a:p>
+            <a:r>
+              <a:rPr lang="en-US" altLang="ja-JP" sz="1100" dirty="0">
+                <a:latin typeface="ＭＳ ゴシック" panose="020B0609070205080204" pitchFamily="49" charset="-128"/>
+                <a:ea typeface="ＭＳ ゴシック" panose="020B0609070205080204" pitchFamily="49" charset="-128"/>
+              </a:rPr>
+              <a:t>C5       2.2u           C0402                       </a:t>
+            </a:r>
+            <a:r>
+              <a:rPr lang="en-US" altLang="ja-JP" sz="1100" dirty="0" err="1">
+                <a:latin typeface="ＭＳ ゴシック" panose="020B0609070205080204" pitchFamily="49" charset="-128"/>
+                <a:ea typeface="ＭＳ ゴシック" panose="020B0609070205080204" pitchFamily="49" charset="-128"/>
+              </a:rPr>
+              <a:t>rcl</a:t>
+            </a:r>
+            <a:r>
+              <a:rPr lang="en-US" altLang="ja-JP" sz="1100" dirty="0">
+                <a:latin typeface="ＭＳ ゴシック" panose="020B0609070205080204" pitchFamily="49" charset="-128"/>
+                <a:ea typeface="ＭＳ ゴシック" panose="020B0609070205080204" pitchFamily="49" charset="-128"/>
+              </a:rPr>
+              <a:t>       (637.5 287.5)         MR180</a:t>
+            </a:r>
+          </a:p>
+          <a:p>
+            <a:r>
+              <a:rPr lang="en-US" altLang="ja-JP" sz="1100" dirty="0">
+                <a:latin typeface="ＭＳ ゴシック" panose="020B0609070205080204" pitchFamily="49" charset="-128"/>
+                <a:ea typeface="ＭＳ ゴシック" panose="020B0609070205080204" pitchFamily="49" charset="-128"/>
+              </a:rPr>
+              <a:t>C8       2.2u           C0402                       </a:t>
+            </a:r>
+            <a:r>
+              <a:rPr lang="en-US" altLang="ja-JP" sz="1100" dirty="0" err="1">
+                <a:latin typeface="ＭＳ ゴシック" panose="020B0609070205080204" pitchFamily="49" charset="-128"/>
+                <a:ea typeface="ＭＳ ゴシック" panose="020B0609070205080204" pitchFamily="49" charset="-128"/>
+              </a:rPr>
+              <a:t>rcl</a:t>
+            </a:r>
+            <a:r>
+              <a:rPr lang="en-US" altLang="ja-JP" sz="1100" dirty="0">
+                <a:latin typeface="ＭＳ ゴシック" panose="020B0609070205080204" pitchFamily="49" charset="-128"/>
+                <a:ea typeface="ＭＳ ゴシック" panose="020B0609070205080204" pitchFamily="49" charset="-128"/>
+              </a:rPr>
+              <a:t>       (525 262.5)           R270</a:t>
+            </a:r>
+          </a:p>
+          <a:p>
+            <a:r>
+              <a:rPr lang="en-US" altLang="ja-JP" sz="1100" dirty="0">
+                <a:latin typeface="ＭＳ ゴシック" panose="020B0609070205080204" pitchFamily="49" charset="-128"/>
+                <a:ea typeface="ＭＳ ゴシック" panose="020B0609070205080204" pitchFamily="49" charset="-128"/>
+              </a:rPr>
+              <a:t>C14      0.01u          C0402                       </a:t>
+            </a:r>
+            <a:r>
+              <a:rPr lang="en-US" altLang="ja-JP" sz="1100" dirty="0" err="1">
+                <a:latin typeface="ＭＳ ゴシック" panose="020B0609070205080204" pitchFamily="49" charset="-128"/>
+                <a:ea typeface="ＭＳ ゴシック" panose="020B0609070205080204" pitchFamily="49" charset="-128"/>
+              </a:rPr>
+              <a:t>rcl</a:t>
+            </a:r>
+            <a:r>
+              <a:rPr lang="en-US" altLang="ja-JP" sz="1100" dirty="0">
+                <a:latin typeface="ＭＳ ゴシック" panose="020B0609070205080204" pitchFamily="49" charset="-128"/>
+                <a:ea typeface="ＭＳ ゴシック" panose="020B0609070205080204" pitchFamily="49" charset="-128"/>
+              </a:rPr>
+              <a:t>       (275 300)             R90</a:t>
+            </a:r>
+          </a:p>
+          <a:p>
+            <a:r>
+              <a:rPr lang="en-US" altLang="ja-JP" sz="1100" dirty="0">
+                <a:latin typeface="ＭＳ ゴシック" panose="020B0609070205080204" pitchFamily="49" charset="-128"/>
+                <a:ea typeface="ＭＳ ゴシック" panose="020B0609070205080204" pitchFamily="49" charset="-128"/>
+              </a:rPr>
+              <a:t>C16      22u            C1206                       </a:t>
+            </a:r>
+            <a:r>
+              <a:rPr lang="en-US" altLang="ja-JP" sz="1100" dirty="0" err="1">
+                <a:latin typeface="ＭＳ ゴシック" panose="020B0609070205080204" pitchFamily="49" charset="-128"/>
+                <a:ea typeface="ＭＳ ゴシック" panose="020B0609070205080204" pitchFamily="49" charset="-128"/>
+              </a:rPr>
+              <a:t>rcl</a:t>
+            </a:r>
+            <a:r>
+              <a:rPr lang="en-US" altLang="ja-JP" sz="1100" dirty="0">
+                <a:latin typeface="ＭＳ ゴシック" panose="020B0609070205080204" pitchFamily="49" charset="-128"/>
+                <a:ea typeface="ＭＳ ゴシック" panose="020B0609070205080204" pitchFamily="49" charset="-128"/>
+              </a:rPr>
+              <a:t>       (350 262.5)           R90</a:t>
+            </a:r>
+          </a:p>
+          <a:p>
+            <a:r>
+              <a:rPr lang="en-US" altLang="ja-JP" sz="1100" dirty="0">
+                <a:latin typeface="ＭＳ ゴシック" panose="020B0609070205080204" pitchFamily="49" charset="-128"/>
+                <a:ea typeface="ＭＳ ゴシック" panose="020B0609070205080204" pitchFamily="49" charset="-128"/>
+              </a:rPr>
+              <a:t>C17      8p             C0402                       </a:t>
+            </a:r>
+            <a:r>
+              <a:rPr lang="en-US" altLang="ja-JP" sz="1100" dirty="0" err="1">
+                <a:latin typeface="ＭＳ ゴシック" panose="020B0609070205080204" pitchFamily="49" charset="-128"/>
+                <a:ea typeface="ＭＳ ゴシック" panose="020B0609070205080204" pitchFamily="49" charset="-128"/>
+              </a:rPr>
+              <a:t>rcl</a:t>
+            </a:r>
+            <a:r>
+              <a:rPr lang="en-US" altLang="ja-JP" sz="1100" dirty="0">
+                <a:latin typeface="ＭＳ ゴシック" panose="020B0609070205080204" pitchFamily="49" charset="-128"/>
+                <a:ea typeface="ＭＳ ゴシック" panose="020B0609070205080204" pitchFamily="49" charset="-128"/>
+              </a:rPr>
+              <a:t>       (300 175)             MR0</a:t>
+            </a:r>
+          </a:p>
+          <a:p>
+            <a:r>
+              <a:rPr lang="en-US" altLang="ja-JP" sz="1100" dirty="0">
+                <a:latin typeface="ＭＳ ゴシック" panose="020B0609070205080204" pitchFamily="49" charset="-128"/>
+                <a:ea typeface="ＭＳ ゴシック" panose="020B0609070205080204" pitchFamily="49" charset="-128"/>
+              </a:rPr>
+              <a:t>C18      8p             C0402                       </a:t>
+            </a:r>
+            <a:r>
+              <a:rPr lang="en-US" altLang="ja-JP" sz="1100" dirty="0" err="1">
+                <a:latin typeface="ＭＳ ゴシック" panose="020B0609070205080204" pitchFamily="49" charset="-128"/>
+                <a:ea typeface="ＭＳ ゴシック" panose="020B0609070205080204" pitchFamily="49" charset="-128"/>
+              </a:rPr>
+              <a:t>rcl</a:t>
+            </a:r>
+            <a:r>
+              <a:rPr lang="en-US" altLang="ja-JP" sz="1100" dirty="0">
+                <a:latin typeface="ＭＳ ゴシック" panose="020B0609070205080204" pitchFamily="49" charset="-128"/>
+                <a:ea typeface="ＭＳ ゴシック" panose="020B0609070205080204" pitchFamily="49" charset="-128"/>
+              </a:rPr>
+              <a:t>       (425 175)             MR180</a:t>
+            </a:r>
+          </a:p>
+          <a:p>
+            <a:r>
+              <a:rPr lang="en-US" altLang="ja-JP" sz="1100" dirty="0">
+                <a:latin typeface="ＭＳ ゴシック" panose="020B0609070205080204" pitchFamily="49" charset="-128"/>
+                <a:ea typeface="ＭＳ ゴシック" panose="020B0609070205080204" pitchFamily="49" charset="-128"/>
+              </a:rPr>
+              <a:t>R2       0              R0402                       </a:t>
+            </a:r>
+            <a:r>
+              <a:rPr lang="en-US" altLang="ja-JP" sz="1100" dirty="0" err="1">
+                <a:latin typeface="ＭＳ ゴシック" panose="020B0609070205080204" pitchFamily="49" charset="-128"/>
+                <a:ea typeface="ＭＳ ゴシック" panose="020B0609070205080204" pitchFamily="49" charset="-128"/>
+              </a:rPr>
+              <a:t>rcl</a:t>
+            </a:r>
+            <a:r>
+              <a:rPr lang="en-US" altLang="ja-JP" sz="1100" dirty="0">
+                <a:latin typeface="ＭＳ ゴシック" panose="020B0609070205080204" pitchFamily="49" charset="-128"/>
+                <a:ea typeface="ＭＳ ゴシック" panose="020B0609070205080204" pitchFamily="49" charset="-128"/>
+              </a:rPr>
+              <a:t>       (1062.5 662.5)        R180</a:t>
+            </a:r>
+          </a:p>
+          <a:p>
+            <a:r>
+              <a:rPr lang="en-US" altLang="ja-JP" sz="1100" dirty="0">
+                <a:latin typeface="ＭＳ ゴシック" panose="020B0609070205080204" pitchFamily="49" charset="-128"/>
+                <a:ea typeface="ＭＳ ゴシック" panose="020B0609070205080204" pitchFamily="49" charset="-128"/>
+              </a:rPr>
+              <a:t>R13      1K             R0402                       </a:t>
+            </a:r>
+            <a:r>
+              <a:rPr lang="en-US" altLang="ja-JP" sz="1100" dirty="0" err="1">
+                <a:latin typeface="ＭＳ ゴシック" panose="020B0609070205080204" pitchFamily="49" charset="-128"/>
+                <a:ea typeface="ＭＳ ゴシック" panose="020B0609070205080204" pitchFamily="49" charset="-128"/>
+              </a:rPr>
+              <a:t>rcl</a:t>
+            </a:r>
+            <a:r>
+              <a:rPr lang="en-US" altLang="ja-JP" sz="1100" dirty="0">
+                <a:latin typeface="ＭＳ ゴシック" panose="020B0609070205080204" pitchFamily="49" charset="-128"/>
+                <a:ea typeface="ＭＳ ゴシック" panose="020B0609070205080204" pitchFamily="49" charset="-128"/>
+              </a:rPr>
+              <a:t>       (450 500)             R0</a:t>
+            </a:r>
+          </a:p>
+          <a:p>
+            <a:r>
+              <a:rPr lang="en-US" altLang="ja-JP" sz="1100" dirty="0">
+                <a:latin typeface="ＭＳ ゴシック" panose="020B0609070205080204" pitchFamily="49" charset="-128"/>
+                <a:ea typeface="ＭＳ ゴシック" panose="020B0609070205080204" pitchFamily="49" charset="-128"/>
+              </a:rPr>
+              <a:t>R14      1K             R0402                       </a:t>
+            </a:r>
+            <a:r>
+              <a:rPr lang="en-US" altLang="ja-JP" sz="1100" dirty="0" err="1">
+                <a:latin typeface="ＭＳ ゴシック" panose="020B0609070205080204" pitchFamily="49" charset="-128"/>
+                <a:ea typeface="ＭＳ ゴシック" panose="020B0609070205080204" pitchFamily="49" charset="-128"/>
+              </a:rPr>
+              <a:t>rcl</a:t>
+            </a:r>
+            <a:r>
+              <a:rPr lang="en-US" altLang="ja-JP" sz="1100" dirty="0">
+                <a:latin typeface="ＭＳ ゴシック" panose="020B0609070205080204" pitchFamily="49" charset="-128"/>
+                <a:ea typeface="ＭＳ ゴシック" panose="020B0609070205080204" pitchFamily="49" charset="-128"/>
+              </a:rPr>
+              <a:t>       (450 400)             R180</a:t>
+            </a:r>
+          </a:p>
+          <a:p>
+            <a:r>
+              <a:rPr lang="en-US" altLang="ja-JP" sz="1100" dirty="0">
+                <a:latin typeface="ＭＳ ゴシック" panose="020B0609070205080204" pitchFamily="49" charset="-128"/>
+                <a:ea typeface="ＭＳ ゴシック" panose="020B0609070205080204" pitchFamily="49" charset="-128"/>
+              </a:rPr>
+              <a:t>R15      1K             R0402                       </a:t>
+            </a:r>
+            <a:r>
+              <a:rPr lang="en-US" altLang="ja-JP" sz="1100" dirty="0" err="1">
+                <a:latin typeface="ＭＳ ゴシック" panose="020B0609070205080204" pitchFamily="49" charset="-128"/>
+                <a:ea typeface="ＭＳ ゴシック" panose="020B0609070205080204" pitchFamily="49" charset="-128"/>
+              </a:rPr>
+              <a:t>rcl</a:t>
+            </a:r>
+            <a:r>
+              <a:rPr lang="en-US" altLang="ja-JP" sz="1100" dirty="0">
+                <a:latin typeface="ＭＳ ゴシック" panose="020B0609070205080204" pitchFamily="49" charset="-128"/>
+                <a:ea typeface="ＭＳ ゴシック" panose="020B0609070205080204" pitchFamily="49" charset="-128"/>
+              </a:rPr>
+              <a:t>       (450 450)             R180</a:t>
+            </a:r>
+          </a:p>
+          <a:p>
+            <a:endParaRPr lang="en-US" altLang="ja-JP" sz="1100" dirty="0">
+              <a:latin typeface="ＭＳ ゴシック" panose="020B0609070205080204" pitchFamily="49" charset="-128"/>
+              <a:ea typeface="ＭＳ ゴシック" panose="020B0609070205080204" pitchFamily="49" charset="-128"/>
+            </a:endParaRPr>
+          </a:p>
+        </p:txBody>
+      </p:sp>
+      <p:sp>
+        <p:nvSpPr>
+          <p:cNvPr id="4" name="テキスト ボックス 3"/>
+          <p:cNvSpPr txBox="1"/>
+          <p:nvPr/>
+        </p:nvSpPr>
+        <p:spPr>
+          <a:xfrm>
+            <a:off x="6783890" y="2462699"/>
+            <a:ext cx="1843774" cy="246221"/>
+          </a:xfrm>
+          <a:prstGeom prst="rect">
+            <a:avLst/>
+          </a:prstGeom>
+          <a:noFill/>
+        </p:spPr>
+        <p:txBody>
+          <a:bodyPr wrap="none" rtlCol="0">
+            <a:spAutoFit/>
+          </a:bodyPr>
+          <a:lstStyle/>
+          <a:p>
+            <a:pPr>
+              <a:spcBef>
+                <a:spcPts val="400"/>
+              </a:spcBef>
+            </a:pPr>
+            <a:r>
+              <a:rPr lang="ja-JP" altLang="en-US" sz="1000" dirty="0">
+                <a:solidFill>
+                  <a:srgbClr val="FF0000"/>
+                </a:solidFill>
+                <a:latin typeface="+mn-ea"/>
+                <a:ea typeface="+mn-ea"/>
+              </a:rPr>
+              <a:t>実装</a:t>
+            </a:r>
+            <a:r>
+              <a:rPr lang="ja-JP" altLang="en-US" sz="1000" dirty="0" smtClean="0">
+                <a:solidFill>
+                  <a:srgbClr val="FF0000"/>
+                </a:solidFill>
+                <a:latin typeface="+mn-ea"/>
+                <a:ea typeface="+mn-ea"/>
+              </a:rPr>
+              <a:t>不要、補足情報が次ページ</a:t>
+            </a:r>
+            <a:endParaRPr kumimoji="1" lang="ja-JP" altLang="en-US" sz="1000" dirty="0" smtClean="0">
+              <a:solidFill>
+                <a:srgbClr val="FF0000"/>
+              </a:solidFill>
+              <a:latin typeface="+mn-ea"/>
+              <a:ea typeface="+mn-ea"/>
+            </a:endParaRPr>
+          </a:p>
+        </p:txBody>
+      </p:sp>
+      <p:sp>
+        <p:nvSpPr>
+          <p:cNvPr id="5" name="正方形/長方形 4"/>
+          <p:cNvSpPr/>
+          <p:nvPr/>
+        </p:nvSpPr>
+        <p:spPr>
+          <a:xfrm>
+            <a:off x="322262" y="2466974"/>
+            <a:ext cx="8498209" cy="192911"/>
+          </a:xfrm>
+          <a:prstGeom prst="rect">
+            <a:avLst/>
+          </a:prstGeom>
+          <a:noFill/>
+          <a:ln w="9525">
+            <a:solidFill>
+              <a:srgbClr val="FF0000"/>
+            </a:solidFill>
+          </a:ln>
+        </p:spPr>
+        <p:style>
+          <a:lnRef idx="2">
+            <a:schemeClr val="accent1">
+              <a:shade val="50000"/>
+            </a:schemeClr>
+          </a:lnRef>
+          <a:fillRef idx="1">
+            <a:schemeClr val="accent1"/>
+          </a:fillRef>
+          <a:effectRef idx="0">
+            <a:schemeClr val="accent1"/>
+          </a:effectRef>
+          <a:fontRef idx="minor">
+            <a:schemeClr val="lt1"/>
+          </a:fontRef>
+        </p:style>
+        <p:txBody>
+          <a:bodyPr rtlCol="0" anchor="ctr"/>
+          <a:lstStyle/>
+          <a:p>
+            <a:pPr algn="ctr">
+              <a:spcBef>
+                <a:spcPts val="400"/>
+              </a:spcBef>
+            </a:pPr>
+            <a:endParaRPr kumimoji="1" lang="ja-JP" altLang="en-US" sz="1800" dirty="0" smtClean="0">
+              <a:solidFill>
+                <a:schemeClr val="tx2"/>
+              </a:solidFill>
+            </a:endParaRPr>
+          </a:p>
+        </p:txBody>
+      </p:sp>
+    </p:spTree>
+    <p:extLst>
+      <p:ext uri="{BB962C8B-B14F-4D97-AF65-F5344CB8AC3E}">
+        <p14:creationId xmlns:p14="http://schemas.microsoft.com/office/powerpoint/2010/main" val="4289882481"/>
+      </p:ext>
+    </p:extLst>
+  </p:cSld>
+  <p:clrMapOvr>
+    <a:masterClrMapping/>
+  </p:clrMapOvr>
+</p:sld>
+</file>
+
+<file path=ppt/slides/slide2.xml><?xml version="1.0" encoding="utf-8"?>
+<p:sld xmlns:a="http://schemas.openxmlformats.org/drawingml/2006/main" xmlns:r="http://schemas.openxmlformats.org/officeDocument/2006/relationships" xmlns:p="http://schemas.openxmlformats.org/presentationml/2006/main">
+  <p:cSld>
+    <p:spTree>
+      <p:nvGrpSpPr>
+        <p:cNvPr id="1" name=""/>
+        <p:cNvGrpSpPr/>
+        <p:nvPr/>
+      </p:nvGrpSpPr>
+      <p:grpSpPr>
+        <a:xfrm>
+          <a:off x="0" y="0"/>
+          <a:ext cx="0" cy="0"/>
+          <a:chOff x="0" y="0"/>
+          <a:chExt cx="0" cy="0"/>
+        </a:xfrm>
+      </p:grpSpPr>
       <p:cxnSp>
         <p:nvCxnSpPr>
           <p:cNvPr id="24" name="直線コネクタ 23"/>
@@ -3988,7 +4758,7 @@
         <p:spPr>
           <a:xfrm>
             <a:off x="902245" y="3903439"/>
-            <a:ext cx="1013419" cy="923330"/>
+            <a:ext cx="978153" cy="1105431"/>
           </a:xfrm>
           <a:prstGeom prst="wedgeRectCallout">
             <a:avLst>
@@ -4120,12 +4890,254 @@
               </a:rPr>
               <a:t>SILK</a:t>
             </a:r>
+          </a:p>
+          <a:p>
+            <a:pPr>
+              <a:spcBef>
+                <a:spcPts val="400"/>
+              </a:spcBef>
+            </a:pPr>
+            <a:r>
+              <a:rPr kumimoji="1" lang="en-US" altLang="ja-JP" sz="1050" dirty="0" smtClean="0">
+                <a:solidFill>
+                  <a:schemeClr val="tx2"/>
+                </a:solidFill>
+                <a:latin typeface="+mn-ea"/>
+                <a:ea typeface="+mn-ea"/>
+              </a:rPr>
+              <a:t>4</a:t>
+            </a:r>
+            <a:r>
+              <a:rPr kumimoji="1" lang="ja-JP" altLang="en-US" sz="1050" dirty="0" smtClean="0">
+                <a:solidFill>
+                  <a:schemeClr val="tx2"/>
+                </a:solidFill>
+                <a:latin typeface="+mn-ea"/>
+                <a:ea typeface="+mn-ea"/>
+              </a:rPr>
+              <a:t>層基板</a:t>
+            </a:r>
             <a:endParaRPr kumimoji="1" lang="en-US" altLang="ja-JP" sz="1050" dirty="0" smtClean="0">
               <a:solidFill>
                 <a:schemeClr val="tx2"/>
               </a:solidFill>
               <a:latin typeface="+mn-ea"/>
               <a:ea typeface="+mn-ea"/>
+            </a:endParaRPr>
+          </a:p>
+        </p:txBody>
+      </p:sp>
+      <p:sp>
+        <p:nvSpPr>
+          <p:cNvPr id="4" name="正方形/長方形 3"/>
+          <p:cNvSpPr/>
+          <p:nvPr/>
+        </p:nvSpPr>
+        <p:spPr>
+          <a:xfrm>
+            <a:off x="3434126" y="1537579"/>
+            <a:ext cx="5180198" cy="841256"/>
+          </a:xfrm>
+          <a:prstGeom prst="rect">
+            <a:avLst/>
+          </a:prstGeom>
+        </p:spPr>
+        <p:txBody>
+          <a:bodyPr wrap="square">
+            <a:spAutoFit/>
+          </a:bodyPr>
+          <a:lstStyle/>
+          <a:p>
+            <a:r>
+              <a:rPr lang="en-US" altLang="ja-JP" sz="1400" dirty="0" smtClean="0">
+                <a:latin typeface="ＭＳ ゴシック" panose="020B0609070205080204" pitchFamily="49" charset="-128"/>
+                <a:ea typeface="ＭＳ ゴシック" panose="020B0609070205080204" pitchFamily="49" charset="-128"/>
+              </a:rPr>
+              <a:t>LAZURITE920J2</a:t>
+            </a:r>
+            <a:r>
+              <a:rPr lang="ja-JP" altLang="en-US" sz="1400" dirty="0" smtClean="0">
+                <a:latin typeface="ＭＳ ゴシック" panose="020B0609070205080204" pitchFamily="49" charset="-128"/>
+                <a:ea typeface="ＭＳ ゴシック" panose="020B0609070205080204" pitchFamily="49" charset="-128"/>
+              </a:rPr>
+              <a:t>は、</a:t>
+            </a:r>
+            <a:r>
+              <a:rPr lang="en-US" altLang="ja-JP" sz="1400" dirty="0" smtClean="0">
+                <a:latin typeface="ＭＳ ゴシック" panose="020B0609070205080204" pitchFamily="49" charset="-128"/>
+                <a:ea typeface="ＭＳ ゴシック" panose="020B0609070205080204" pitchFamily="49" charset="-128"/>
+              </a:rPr>
+              <a:t>3</a:t>
+            </a:r>
+            <a:r>
+              <a:rPr lang="ja-JP" altLang="en-US" sz="1400" dirty="0" err="1" smtClean="0">
+                <a:latin typeface="ＭＳ ゴシック" panose="020B0609070205080204" pitchFamily="49" charset="-128"/>
+                <a:ea typeface="ＭＳ ゴシック" panose="020B0609070205080204" pitchFamily="49" charset="-128"/>
+              </a:rPr>
+              <a:t>つの</a:t>
+            </a:r>
+            <a:r>
+              <a:rPr lang="ja-JP" altLang="en-US" sz="1400" dirty="0" smtClean="0">
+                <a:latin typeface="ＭＳ ゴシック" panose="020B0609070205080204" pitchFamily="49" charset="-128"/>
+                <a:ea typeface="ＭＳ ゴシック" panose="020B0609070205080204" pitchFamily="49" charset="-128"/>
+              </a:rPr>
+              <a:t>部品をまとめてライブラリ化しました。</a:t>
+            </a:r>
+            <a:endParaRPr lang="en-US" altLang="ja-JP" sz="1400" dirty="0" smtClean="0">
+              <a:latin typeface="ＭＳ ゴシック" panose="020B0609070205080204" pitchFamily="49" charset="-128"/>
+              <a:ea typeface="ＭＳ ゴシック" panose="020B0609070205080204" pitchFamily="49" charset="-128"/>
+            </a:endParaRPr>
+          </a:p>
+          <a:p>
+            <a:pPr>
+              <a:spcBef>
+                <a:spcPts val="400"/>
+              </a:spcBef>
+            </a:pPr>
+            <a:r>
+              <a:rPr lang="ja-JP" altLang="en-US" sz="1400" dirty="0">
+                <a:solidFill>
+                  <a:schemeClr val="tx2"/>
+                </a:solidFill>
+                <a:latin typeface="+mn-ea"/>
+              </a:rPr>
+              <a:t>廣杉</a:t>
+            </a:r>
+            <a:r>
+              <a:rPr lang="ja-JP" altLang="en-US" sz="1400" dirty="0" smtClean="0">
+                <a:solidFill>
+                  <a:schemeClr val="tx2"/>
+                </a:solidFill>
+                <a:latin typeface="+mn-ea"/>
+              </a:rPr>
+              <a:t>計器 </a:t>
+            </a:r>
+            <a:r>
+              <a:rPr lang="en-US" altLang="ja-JP" sz="1400" dirty="0" smtClean="0">
+                <a:solidFill>
+                  <a:schemeClr val="tx2"/>
+                </a:solidFill>
+                <a:latin typeface="+mn-ea"/>
+              </a:rPr>
+              <a:t>PSS-720103-05</a:t>
+            </a:r>
+            <a:r>
+              <a:rPr lang="en-US" altLang="ja-JP" sz="1400" dirty="0">
+                <a:solidFill>
+                  <a:schemeClr val="tx2"/>
+                </a:solidFill>
+                <a:latin typeface="+mn-ea"/>
+              </a:rPr>
+              <a:t> </a:t>
+            </a:r>
+            <a:r>
+              <a:rPr lang="en-US" altLang="ja-JP" sz="1400" dirty="0" smtClean="0">
+                <a:solidFill>
+                  <a:schemeClr val="tx2"/>
+                </a:solidFill>
+                <a:latin typeface="+mn-ea"/>
+              </a:rPr>
+              <a:t>2x5 </a:t>
+            </a:r>
+            <a:r>
+              <a:rPr lang="ja-JP" altLang="en-US" sz="1400" dirty="0" smtClean="0">
+                <a:solidFill>
+                  <a:schemeClr val="tx2"/>
+                </a:solidFill>
+                <a:latin typeface="+mn-ea"/>
+              </a:rPr>
+              <a:t>ハーフピッチピンヘッダ</a:t>
+            </a:r>
+            <a:endParaRPr lang="en-US" altLang="ja-JP" sz="1400" dirty="0" smtClean="0">
+              <a:solidFill>
+                <a:schemeClr val="tx2"/>
+              </a:solidFill>
+              <a:latin typeface="+mn-ea"/>
+            </a:endParaRPr>
+          </a:p>
+          <a:p>
+            <a:pPr>
+              <a:spcBef>
+                <a:spcPts val="400"/>
+              </a:spcBef>
+            </a:pPr>
+            <a:r>
+              <a:rPr lang="ja-JP" altLang="en-US" sz="1400" dirty="0">
+                <a:solidFill>
+                  <a:schemeClr val="tx2"/>
+                </a:solidFill>
+                <a:latin typeface="+mn-ea"/>
+              </a:rPr>
+              <a:t>廣杉</a:t>
+            </a:r>
+            <a:r>
+              <a:rPr lang="ja-JP" altLang="en-US" sz="1400" dirty="0" smtClean="0">
+                <a:solidFill>
+                  <a:schemeClr val="tx2"/>
+                </a:solidFill>
+                <a:latin typeface="+mn-ea"/>
+              </a:rPr>
+              <a:t>計器 </a:t>
+            </a:r>
+            <a:r>
+              <a:rPr lang="en-US" altLang="ja-JP" sz="1400" dirty="0" smtClean="0">
+                <a:solidFill>
+                  <a:schemeClr val="tx2"/>
+                </a:solidFill>
+                <a:latin typeface="+mn-ea"/>
+              </a:rPr>
+              <a:t>PSS-710103-10</a:t>
+            </a:r>
+            <a:r>
+              <a:rPr lang="en-US" altLang="ja-JP" sz="1400" dirty="0">
+                <a:solidFill>
+                  <a:schemeClr val="tx2"/>
+                </a:solidFill>
+                <a:latin typeface="+mn-ea"/>
+              </a:rPr>
+              <a:t> </a:t>
+            </a:r>
+            <a:r>
+              <a:rPr lang="en-US" altLang="ja-JP" sz="1400" dirty="0" smtClean="0">
+                <a:solidFill>
+                  <a:schemeClr val="tx2"/>
+                </a:solidFill>
+                <a:latin typeface="+mn-ea"/>
+              </a:rPr>
+              <a:t>1x10 </a:t>
+            </a:r>
+            <a:r>
+              <a:rPr lang="ja-JP" altLang="en-US" sz="1400" dirty="0" smtClean="0">
+                <a:solidFill>
+                  <a:schemeClr val="tx2"/>
+                </a:solidFill>
+                <a:latin typeface="+mn-ea"/>
+              </a:rPr>
+              <a:t>ハーフピッチピンヘッダ</a:t>
+            </a:r>
+            <a:r>
+              <a:rPr lang="ja-JP" altLang="en-US" sz="1400" dirty="0">
+                <a:solidFill>
+                  <a:schemeClr val="tx2"/>
+                </a:solidFill>
+                <a:latin typeface="+mn-ea"/>
+              </a:rPr>
+              <a:t>（</a:t>
+            </a:r>
+            <a:r>
+              <a:rPr lang="ja-JP" altLang="en-US" sz="1400" dirty="0" smtClean="0">
+                <a:solidFill>
+                  <a:schemeClr val="tx2"/>
+                </a:solidFill>
+                <a:latin typeface="+mn-ea"/>
+              </a:rPr>
+              <a:t>２個）</a:t>
+            </a:r>
+            <a:endParaRPr lang="ja-JP" altLang="en-US" sz="1400" dirty="0">
+              <a:solidFill>
+                <a:schemeClr val="tx2"/>
+              </a:solidFill>
+              <a:latin typeface="+mn-ea"/>
             </a:endParaRPr>
           </a:p>
         </p:txBody>

</xml_diff>